<commit_message>
* Update C# 8.0 Features comments and PPT
</commit_message>
<xml_diff>
--- a/CSFeatures/CS60.pptx
+++ b/CSFeatures/CS60.pptx
@@ -3120,391 +3120,6 @@
       <dsp:cNvGrpSpPr/>
     </dsp:nvGrpSpPr>
     <dsp:grpSpPr/>
-    <dsp:sp modelId="{D0807BC8-3214-4EA7-83A1-C064A52D56B2}">
-      <dsp:nvSpPr>
-        <dsp:cNvPr id="0" name=""/>
-        <dsp:cNvSpPr/>
-      </dsp:nvSpPr>
-      <dsp:spPr>
-        <a:xfrm rot="16200000">
-          <a:off x="-1502271" y="1507478"/>
-          <a:ext cx="4842169" cy="1827212"/>
-        </a:xfrm>
-        <a:prstGeom prst="flowChartManualOperation">
-          <a:avLst/>
-        </a:prstGeom>
-        <a:solidFill>
-          <a:schemeClr val="accent2">
-            <a:hueOff val="0"/>
-            <a:satOff val="0"/>
-            <a:lumOff val="0"/>
-            <a:alphaOff val="0"/>
-          </a:schemeClr>
-        </a:solidFill>
-        <a:ln w="25400" cap="flat" cmpd="sng" algn="ctr">
-          <a:solidFill>
-            <a:schemeClr val="lt1">
-              <a:hueOff val="0"/>
-              <a:satOff val="0"/>
-              <a:lumOff val="0"/>
-              <a:alphaOff val="0"/>
-            </a:schemeClr>
-          </a:solidFill>
-          <a:prstDash val="solid"/>
-        </a:ln>
-        <a:effectLst/>
-      </dsp:spPr>
-      <dsp:style>
-        <a:lnRef idx="2">
-          <a:scrgbClr r="0" g="0" b="0"/>
-        </a:lnRef>
-        <a:fillRef idx="1">
-          <a:scrgbClr r="0" g="0" b="0"/>
-        </a:fillRef>
-        <a:effectRef idx="0">
-          <a:scrgbClr r="0" g="0" b="0"/>
-        </a:effectRef>
-        <a:fontRef idx="minor">
-          <a:schemeClr val="lt1"/>
-        </a:fontRef>
-      </dsp:style>
-      <dsp:txBody>
-        <a:bodyPr spcFirstLastPara="0" vert="horz" wrap="square" lIns="400050" tIns="0" rIns="400844" bIns="0" numCol="1" spcCol="1270" anchor="ctr" anchorCtr="0">
-          <a:noAutofit/>
-        </a:bodyPr>
-        <a:lstStyle/>
-        <a:p>
-          <a:pPr lvl="0" algn="ctr" defTabSz="2800350" rtl="0">
-            <a:lnSpc>
-              <a:spcPct val="90000"/>
-            </a:lnSpc>
-            <a:spcBef>
-              <a:spcPct val="0"/>
-            </a:spcBef>
-            <a:spcAft>
-              <a:spcPct val="35000"/>
-            </a:spcAft>
-          </a:pPr>
-          <a:r>
-            <a:rPr lang="es-ES" sz="6300" kern="1200" dirty="0" smtClean="0"/>
-            <a:t>C# 6.0</a:t>
-          </a:r>
-          <a:endParaRPr lang="es-ES" sz="6300" kern="1200" dirty="0"/>
-        </a:p>
-      </dsp:txBody>
-      <dsp:txXfrm rot="5400000">
-        <a:off x="5207" y="968434"/>
-        <a:ext cx="1827212" cy="2905301"/>
-      </dsp:txXfrm>
-    </dsp:sp>
-    <dsp:sp modelId="{A4A084B5-831E-4886-9159-E3805285A6E3}">
-      <dsp:nvSpPr>
-        <dsp:cNvPr id="0" name=""/>
-        <dsp:cNvSpPr/>
-      </dsp:nvSpPr>
-      <dsp:spPr>
-        <a:xfrm rot="16200000">
-          <a:off x="461981" y="1507478"/>
-          <a:ext cx="4842169" cy="1827212"/>
-        </a:xfrm>
-        <a:prstGeom prst="flowChartManualOperation">
-          <a:avLst/>
-        </a:prstGeom>
-        <a:solidFill>
-          <a:schemeClr val="accent3">
-            <a:hueOff val="0"/>
-            <a:satOff val="0"/>
-            <a:lumOff val="0"/>
-            <a:alphaOff val="0"/>
-          </a:schemeClr>
-        </a:solidFill>
-        <a:ln w="25400" cap="flat" cmpd="sng" algn="ctr">
-          <a:solidFill>
-            <a:schemeClr val="lt1">
-              <a:hueOff val="0"/>
-              <a:satOff val="0"/>
-              <a:lumOff val="0"/>
-              <a:alphaOff val="0"/>
-            </a:schemeClr>
-          </a:solidFill>
-          <a:prstDash val="solid"/>
-        </a:ln>
-        <a:effectLst/>
-      </dsp:spPr>
-      <dsp:style>
-        <a:lnRef idx="2">
-          <a:scrgbClr r="0" g="0" b="0"/>
-        </a:lnRef>
-        <a:fillRef idx="1">
-          <a:scrgbClr r="0" g="0" b="0"/>
-        </a:fillRef>
-        <a:effectRef idx="0">
-          <a:scrgbClr r="0" g="0" b="0"/>
-        </a:effectRef>
-        <a:fontRef idx="minor">
-          <a:schemeClr val="lt1"/>
-        </a:fontRef>
-      </dsp:style>
-      <dsp:txBody>
-        <a:bodyPr spcFirstLastPara="0" vert="horz" wrap="square" lIns="400050" tIns="0" rIns="400844" bIns="0" numCol="1" spcCol="1270" anchor="ctr" anchorCtr="0">
-          <a:noAutofit/>
-        </a:bodyPr>
-        <a:lstStyle/>
-        <a:p>
-          <a:pPr lvl="0" algn="ctr" defTabSz="2800350" rtl="0">
-            <a:lnSpc>
-              <a:spcPct val="90000"/>
-            </a:lnSpc>
-            <a:spcBef>
-              <a:spcPct val="0"/>
-            </a:spcBef>
-            <a:spcAft>
-              <a:spcPct val="35000"/>
-            </a:spcAft>
-          </a:pPr>
-          <a:r>
-            <a:rPr lang="es-ES" sz="6300" kern="1200" dirty="0" smtClean="0"/>
-            <a:t>C# 7.0</a:t>
-          </a:r>
-          <a:endParaRPr lang="es-ES" sz="6300" kern="1200" dirty="0"/>
-        </a:p>
-      </dsp:txBody>
-      <dsp:txXfrm rot="5400000">
-        <a:off x="1969459" y="968434"/>
-        <a:ext cx="1827212" cy="2905301"/>
-      </dsp:txXfrm>
-    </dsp:sp>
-    <dsp:sp modelId="{5C760EA2-0703-43E1-A48C-D563D9B9CF39}">
-      <dsp:nvSpPr>
-        <dsp:cNvPr id="0" name=""/>
-        <dsp:cNvSpPr/>
-      </dsp:nvSpPr>
-      <dsp:spPr>
-        <a:xfrm rot="16200000">
-          <a:off x="2426234" y="1507478"/>
-          <a:ext cx="4842169" cy="1827212"/>
-        </a:xfrm>
-        <a:prstGeom prst="flowChartManualOperation">
-          <a:avLst/>
-        </a:prstGeom>
-        <a:solidFill>
-          <a:schemeClr val="accent4">
-            <a:hueOff val="0"/>
-            <a:satOff val="0"/>
-            <a:lumOff val="0"/>
-            <a:alphaOff val="0"/>
-          </a:schemeClr>
-        </a:solidFill>
-        <a:ln w="25400" cap="flat" cmpd="sng" algn="ctr">
-          <a:solidFill>
-            <a:schemeClr val="lt1">
-              <a:hueOff val="0"/>
-              <a:satOff val="0"/>
-              <a:lumOff val="0"/>
-              <a:alphaOff val="0"/>
-            </a:schemeClr>
-          </a:solidFill>
-          <a:prstDash val="solid"/>
-        </a:ln>
-        <a:effectLst/>
-      </dsp:spPr>
-      <dsp:style>
-        <a:lnRef idx="2">
-          <a:scrgbClr r="0" g="0" b="0"/>
-        </a:lnRef>
-        <a:fillRef idx="1">
-          <a:scrgbClr r="0" g="0" b="0"/>
-        </a:fillRef>
-        <a:effectRef idx="0">
-          <a:scrgbClr r="0" g="0" b="0"/>
-        </a:effectRef>
-        <a:fontRef idx="minor">
-          <a:schemeClr val="lt1"/>
-        </a:fontRef>
-      </dsp:style>
-      <dsp:txBody>
-        <a:bodyPr spcFirstLastPara="0" vert="horz" wrap="square" lIns="400050" tIns="0" rIns="400844" bIns="0" numCol="1" spcCol="1270" anchor="ctr" anchorCtr="0">
-          <a:noAutofit/>
-        </a:bodyPr>
-        <a:lstStyle/>
-        <a:p>
-          <a:pPr lvl="0" algn="ctr" defTabSz="2800350" rtl="0">
-            <a:lnSpc>
-              <a:spcPct val="90000"/>
-            </a:lnSpc>
-            <a:spcBef>
-              <a:spcPct val="0"/>
-            </a:spcBef>
-            <a:spcAft>
-              <a:spcPct val="35000"/>
-            </a:spcAft>
-          </a:pPr>
-          <a:r>
-            <a:rPr lang="es-ES" sz="6300" kern="1200" dirty="0" smtClean="0"/>
-            <a:t>C# 7.1</a:t>
-          </a:r>
-          <a:endParaRPr lang="es-ES" sz="6300" kern="1200" dirty="0"/>
-        </a:p>
-      </dsp:txBody>
-      <dsp:txXfrm rot="5400000">
-        <a:off x="3933712" y="968434"/>
-        <a:ext cx="1827212" cy="2905301"/>
-      </dsp:txXfrm>
-    </dsp:sp>
-    <dsp:sp modelId="{7885D384-7AC2-486A-B21B-402622FF55CE}">
-      <dsp:nvSpPr>
-        <dsp:cNvPr id="0" name=""/>
-        <dsp:cNvSpPr/>
-      </dsp:nvSpPr>
-      <dsp:spPr>
-        <a:xfrm rot="16200000">
-          <a:off x="4390487" y="1507478"/>
-          <a:ext cx="4842169" cy="1827212"/>
-        </a:xfrm>
-        <a:prstGeom prst="flowChartManualOperation">
-          <a:avLst/>
-        </a:prstGeom>
-        <a:solidFill>
-          <a:schemeClr val="accent5">
-            <a:hueOff val="0"/>
-            <a:satOff val="0"/>
-            <a:lumOff val="0"/>
-            <a:alphaOff val="0"/>
-          </a:schemeClr>
-        </a:solidFill>
-        <a:ln w="25400" cap="flat" cmpd="sng" algn="ctr">
-          <a:solidFill>
-            <a:schemeClr val="lt1">
-              <a:hueOff val="0"/>
-              <a:satOff val="0"/>
-              <a:lumOff val="0"/>
-              <a:alphaOff val="0"/>
-            </a:schemeClr>
-          </a:solidFill>
-          <a:prstDash val="solid"/>
-        </a:ln>
-        <a:effectLst/>
-      </dsp:spPr>
-      <dsp:style>
-        <a:lnRef idx="2">
-          <a:scrgbClr r="0" g="0" b="0"/>
-        </a:lnRef>
-        <a:fillRef idx="1">
-          <a:scrgbClr r="0" g="0" b="0"/>
-        </a:fillRef>
-        <a:effectRef idx="0">
-          <a:scrgbClr r="0" g="0" b="0"/>
-        </a:effectRef>
-        <a:fontRef idx="minor">
-          <a:schemeClr val="lt1"/>
-        </a:fontRef>
-      </dsp:style>
-      <dsp:txBody>
-        <a:bodyPr spcFirstLastPara="0" vert="horz" wrap="square" lIns="400050" tIns="0" rIns="400844" bIns="0" numCol="1" spcCol="1270" anchor="ctr" anchorCtr="0">
-          <a:noAutofit/>
-        </a:bodyPr>
-        <a:lstStyle/>
-        <a:p>
-          <a:pPr lvl="0" algn="ctr" defTabSz="2800350" rtl="0">
-            <a:lnSpc>
-              <a:spcPct val="90000"/>
-            </a:lnSpc>
-            <a:spcBef>
-              <a:spcPct val="0"/>
-            </a:spcBef>
-            <a:spcAft>
-              <a:spcPct val="35000"/>
-            </a:spcAft>
-          </a:pPr>
-          <a:r>
-            <a:rPr lang="es-ES" sz="6300" kern="1200" dirty="0" smtClean="0"/>
-            <a:t>C# 7.2</a:t>
-          </a:r>
-          <a:endParaRPr lang="es-ES" sz="6300" kern="1200" dirty="0"/>
-        </a:p>
-      </dsp:txBody>
-      <dsp:txXfrm rot="5400000">
-        <a:off x="5897965" y="968434"/>
-        <a:ext cx="1827212" cy="2905301"/>
-      </dsp:txXfrm>
-    </dsp:sp>
-    <dsp:sp modelId="{42B20AE0-90BA-49BD-A2FF-3EE3A010A3EF}">
-      <dsp:nvSpPr>
-        <dsp:cNvPr id="0" name=""/>
-        <dsp:cNvSpPr/>
-      </dsp:nvSpPr>
-      <dsp:spPr>
-        <a:xfrm rot="16200000">
-          <a:off x="6354740" y="1507478"/>
-          <a:ext cx="4842169" cy="1827212"/>
-        </a:xfrm>
-        <a:prstGeom prst="flowChartManualOperation">
-          <a:avLst/>
-        </a:prstGeom>
-        <a:solidFill>
-          <a:schemeClr val="accent6">
-            <a:hueOff val="0"/>
-            <a:satOff val="0"/>
-            <a:lumOff val="0"/>
-            <a:alphaOff val="0"/>
-          </a:schemeClr>
-        </a:solidFill>
-        <a:ln w="25400" cap="flat" cmpd="sng" algn="ctr">
-          <a:solidFill>
-            <a:schemeClr val="lt1">
-              <a:hueOff val="0"/>
-              <a:satOff val="0"/>
-              <a:lumOff val="0"/>
-              <a:alphaOff val="0"/>
-            </a:schemeClr>
-          </a:solidFill>
-          <a:prstDash val="solid"/>
-        </a:ln>
-        <a:effectLst/>
-      </dsp:spPr>
-      <dsp:style>
-        <a:lnRef idx="2">
-          <a:scrgbClr r="0" g="0" b="0"/>
-        </a:lnRef>
-        <a:fillRef idx="1">
-          <a:scrgbClr r="0" g="0" b="0"/>
-        </a:fillRef>
-        <a:effectRef idx="0">
-          <a:scrgbClr r="0" g="0" b="0"/>
-        </a:effectRef>
-        <a:fontRef idx="minor">
-          <a:schemeClr val="lt1"/>
-        </a:fontRef>
-      </dsp:style>
-      <dsp:txBody>
-        <a:bodyPr spcFirstLastPara="0" vert="horz" wrap="square" lIns="400050" tIns="0" rIns="400844" bIns="0" numCol="1" spcCol="1270" anchor="ctr" anchorCtr="0">
-          <a:noAutofit/>
-        </a:bodyPr>
-        <a:lstStyle/>
-        <a:p>
-          <a:pPr lvl="0" algn="ctr" defTabSz="2800350" rtl="0">
-            <a:lnSpc>
-              <a:spcPct val="90000"/>
-            </a:lnSpc>
-            <a:spcBef>
-              <a:spcPct val="0"/>
-            </a:spcBef>
-            <a:spcAft>
-              <a:spcPct val="35000"/>
-            </a:spcAft>
-          </a:pPr>
-          <a:r>
-            <a:rPr lang="es-ES" sz="6300" kern="1200" dirty="0" smtClean="0"/>
-            <a:t>C# …</a:t>
-          </a:r>
-          <a:endParaRPr lang="es-ES" sz="6300" kern="1200" dirty="0"/>
-        </a:p>
-      </dsp:txBody>
-      <dsp:txXfrm rot="5400000">
-        <a:off x="7862218" y="968434"/>
-        <a:ext cx="1827212" cy="2905301"/>
-      </dsp:txXfrm>
-    </dsp:sp>
   </dsp:spTree>
 </dsp:drawing>
 </file>
@@ -6038,7 +5653,7 @@
           <a:p>
             <a:fld id="{27B8802E-0937-47D4-BC87-B51C9102E14A}" type="datetimeFigureOut">
               <a:rPr lang="es-ES" smtClean="0"/>
-              <a:t>06/07/2020</a:t>
+              <a:t>09/07/2020</a:t>
             </a:fld>
             <a:endParaRPr lang="es-ES"/>
           </a:p>
@@ -6681,7 +6296,7 @@
                 <a:tabLst/>
                 <a:defRPr/>
               </a:pPr>
-              <a:t>7/6/2020 7:00 PM</a:t>
+              <a:t>7/9/2020 8:27 PM</a:t>
             </a:fld>
             <a:endParaRPr kumimoji="0" lang="en-US" sz="1200" b="0" i="0" u="none" strike="noStrike" kern="1200" cap="none" spc="0" normalizeH="0" baseline="0" noProof="0" dirty="0">
               <a:ln>
@@ -7087,7 +6702,7 @@
                 <a:tabLst/>
                 <a:defRPr/>
               </a:pPr>
-              <a:t>7/6/2020 7:00 PM</a:t>
+              <a:t>7/9/2020 8:27 PM</a:t>
             </a:fld>
             <a:endParaRPr kumimoji="0" lang="en-US" sz="1200" b="0" i="0" u="none" strike="noStrike" kern="1200" cap="none" spc="0" normalizeH="0" baseline="0" noProof="0" dirty="0">
               <a:ln>
@@ -7489,7 +7104,7 @@
                 <a:tabLst/>
                 <a:defRPr/>
               </a:pPr>
-              <a:t>7/6/2020 7:00 PM</a:t>
+              <a:t>7/9/2020 8:27 PM</a:t>
             </a:fld>
             <a:endParaRPr kumimoji="0" lang="en-US" sz="1200" b="0" i="0" u="none" strike="noStrike" kern="1200" cap="none" spc="0" normalizeH="0" baseline="0" noProof="0" dirty="0">
               <a:ln>
@@ -7891,7 +7506,7 @@
                 <a:tabLst/>
                 <a:defRPr/>
               </a:pPr>
-              <a:t>7/6/2020 7:00 PM</a:t>
+              <a:t>7/9/2020 8:27 PM</a:t>
             </a:fld>
             <a:endParaRPr kumimoji="0" lang="en-US" sz="1200" b="0" i="0" u="none" strike="noStrike" kern="1200" cap="none" spc="0" normalizeH="0" baseline="0" noProof="0" dirty="0">
               <a:ln>
@@ -9009,7 +8624,7 @@
                 <a:tabLst/>
                 <a:defRPr/>
               </a:pPr>
-              <a:t>7/6/2020 7:00 PM</a:t>
+              <a:t>7/9/2020 8:27 PM</a:t>
             </a:fld>
             <a:endParaRPr kumimoji="0" lang="en-US" sz="1200" b="0" i="0" u="none" strike="noStrike" kern="1200" cap="none" spc="0" normalizeH="0" baseline="0" noProof="0" dirty="0">
               <a:ln>
@@ -9411,7 +9026,7 @@
                 <a:tabLst/>
                 <a:defRPr/>
               </a:pPr>
-              <a:t>7/6/2020 7:00 PM</a:t>
+              <a:t>7/9/2020 8:27 PM</a:t>
             </a:fld>
             <a:endParaRPr kumimoji="0" lang="en-US" sz="1200" b="0" i="0" u="none" strike="noStrike" kern="1200" cap="none" spc="0" normalizeH="0" baseline="0" noProof="0" dirty="0">
               <a:ln>
@@ -9800,7 +9415,7 @@
           <a:p>
             <a:fld id="{19846C5A-1DDF-42C4-9FB4-FFCE11C434AC}" type="datetimeFigureOut">
               <a:rPr lang="es-ES" smtClean="0"/>
-              <a:t>06/07/2020</a:t>
+              <a:t>09/07/2020</a:t>
             </a:fld>
             <a:endParaRPr lang="es-ES"/>
           </a:p>
@@ -9970,7 +9585,7 @@
           <a:p>
             <a:fld id="{19846C5A-1DDF-42C4-9FB4-FFCE11C434AC}" type="datetimeFigureOut">
               <a:rPr lang="es-ES" smtClean="0"/>
-              <a:t>06/07/2020</a:t>
+              <a:t>09/07/2020</a:t>
             </a:fld>
             <a:endParaRPr lang="es-ES"/>
           </a:p>
@@ -10150,7 +9765,7 @@
           <a:p>
             <a:fld id="{19846C5A-1DDF-42C4-9FB4-FFCE11C434AC}" type="datetimeFigureOut">
               <a:rPr lang="es-ES" smtClean="0"/>
-              <a:t>06/07/2020</a:t>
+              <a:t>09/07/2020</a:t>
             </a:fld>
             <a:endParaRPr lang="es-ES"/>
           </a:p>
@@ -10455,7 +10070,7 @@
           <a:p>
             <a:fld id="{19846C5A-1DDF-42C4-9FB4-FFCE11C434AC}" type="datetimeFigureOut">
               <a:rPr lang="es-ES" smtClean="0"/>
-              <a:t>06/07/2020</a:t>
+              <a:t>09/07/2020</a:t>
             </a:fld>
             <a:endParaRPr lang="es-ES"/>
           </a:p>
@@ -10701,7 +10316,7 @@
           <a:p>
             <a:fld id="{19846C5A-1DDF-42C4-9FB4-FFCE11C434AC}" type="datetimeFigureOut">
               <a:rPr lang="es-ES" smtClean="0"/>
-              <a:t>06/07/2020</a:t>
+              <a:t>09/07/2020</a:t>
             </a:fld>
             <a:endParaRPr lang="es-ES"/>
           </a:p>
@@ -10989,7 +10604,7 @@
           <a:p>
             <a:fld id="{19846C5A-1DDF-42C4-9FB4-FFCE11C434AC}" type="datetimeFigureOut">
               <a:rPr lang="es-ES" smtClean="0"/>
-              <a:t>06/07/2020</a:t>
+              <a:t>09/07/2020</a:t>
             </a:fld>
             <a:endParaRPr lang="es-ES"/>
           </a:p>
@@ -11411,7 +11026,7 @@
           <a:p>
             <a:fld id="{19846C5A-1DDF-42C4-9FB4-FFCE11C434AC}" type="datetimeFigureOut">
               <a:rPr lang="es-ES" smtClean="0"/>
-              <a:t>06/07/2020</a:t>
+              <a:t>09/07/2020</a:t>
             </a:fld>
             <a:endParaRPr lang="es-ES"/>
           </a:p>
@@ -11529,7 +11144,7 @@
           <a:p>
             <a:fld id="{19846C5A-1DDF-42C4-9FB4-FFCE11C434AC}" type="datetimeFigureOut">
               <a:rPr lang="es-ES" smtClean="0"/>
-              <a:t>06/07/2020</a:t>
+              <a:t>09/07/2020</a:t>
             </a:fld>
             <a:endParaRPr lang="es-ES"/>
           </a:p>
@@ -11624,7 +11239,7 @@
           <a:p>
             <a:fld id="{19846C5A-1DDF-42C4-9FB4-FFCE11C434AC}" type="datetimeFigureOut">
               <a:rPr lang="es-ES" smtClean="0"/>
-              <a:t>06/07/2020</a:t>
+              <a:t>09/07/2020</a:t>
             </a:fld>
             <a:endParaRPr lang="es-ES"/>
           </a:p>
@@ -11901,7 +11516,7 @@
           <a:p>
             <a:fld id="{19846C5A-1DDF-42C4-9FB4-FFCE11C434AC}" type="datetimeFigureOut">
               <a:rPr lang="es-ES" smtClean="0"/>
-              <a:t>06/07/2020</a:t>
+              <a:t>09/07/2020</a:t>
             </a:fld>
             <a:endParaRPr lang="es-ES"/>
           </a:p>
@@ -12154,7 +11769,7 @@
           <a:p>
             <a:fld id="{19846C5A-1DDF-42C4-9FB4-FFCE11C434AC}" type="datetimeFigureOut">
               <a:rPr lang="es-ES" smtClean="0"/>
-              <a:t>06/07/2020</a:t>
+              <a:t>09/07/2020</a:t>
             </a:fld>
             <a:endParaRPr lang="es-ES"/>
           </a:p>
@@ -12367,7 +11982,7 @@
           <a:p>
             <a:fld id="{19846C5A-1DDF-42C4-9FB4-FFCE11C434AC}" type="datetimeFigureOut">
               <a:rPr lang="es-ES" smtClean="0"/>
-              <a:t>06/07/2020</a:t>
+              <a:t>09/07/2020</a:t>
             </a:fld>
             <a:endParaRPr lang="es-ES"/>
           </a:p>
@@ -12985,17 +12600,7 @@
                 <a:latin typeface="Segoe UI" panose="020B0502040204020203" pitchFamily="34" charset="0"/>
                 <a:cs typeface="Segoe UI" panose="020B0502040204020203" pitchFamily="34" charset="0"/>
               </a:rPr>
-              <a:t>C</a:t>
-            </a:r>
-            <a:r>
-              <a:rPr lang="es-ES" sz="5400" b="1" dirty="0" smtClean="0">
-                <a:solidFill>
-                  <a:srgbClr val="92D050"/>
-                </a:solidFill>
-                <a:latin typeface="Segoe UI" panose="020B0502040204020203" pitchFamily="34" charset="0"/>
-                <a:cs typeface="Segoe UI" panose="020B0502040204020203" pitchFamily="34" charset="0"/>
-              </a:rPr>
-              <a:t># 6.0</a:t>
+              <a:t>C# 6.0</a:t>
             </a:r>
             <a:endParaRPr lang="en-US" sz="5400" b="1" dirty="0">
               <a:solidFill>
@@ -13075,14 +12680,7 @@
                 <a:latin typeface="Segoe UI" panose="020B0502040204020203" pitchFamily="34" charset="0"/>
                 <a:cs typeface="Segoe UI" panose="020B0502040204020203" pitchFamily="34" charset="0"/>
               </a:rPr>
-              <a:t>NEW FEATURES</a:t>
-            </a:r>
-            <a:r>
-              <a:rPr lang="es-ES" sz="6600" dirty="0" smtClean="0">
-                <a:latin typeface="Segoe UI" panose="020B0502040204020203" pitchFamily="34" charset="0"/>
-                <a:cs typeface="Segoe UI" panose="020B0502040204020203" pitchFamily="34" charset="0"/>
-              </a:rPr>
-              <a:t> C#</a:t>
+              <a:t>NEW FEATURES C#</a:t>
             </a:r>
             <a:endParaRPr lang="es-ES" sz="6600" dirty="0">
               <a:latin typeface="Segoe UI" panose="020B0502040204020203" pitchFamily="34" charset="0"/>
@@ -18174,10 +17772,6 @@
               </a:rPr>
               <a:t> </a:t>
             </a:r>
-            <a:endParaRPr lang="es-ES" sz="2000" dirty="0" smtClean="0">
-              <a:latin typeface="Segoe UI Light" panose="020B0502040204020203" pitchFamily="34" charset="0"/>
-              <a:cs typeface="Segoe UI Light" panose="020B0502040204020203" pitchFamily="34" charset="0"/>
-            </a:endParaRPr>
           </a:p>
           <a:p>
             <a:pPr marL="0" indent="0">
@@ -18193,6 +17787,90 @@
           </a:p>
         </p:txBody>
       </p:sp>
+      <p:sp>
+        <p:nvSpPr>
+          <p:cNvPr id="3" name="Rectangle 2"/>
+          <p:cNvSpPr/>
+          <p:nvPr/>
+        </p:nvSpPr>
+        <p:spPr>
+          <a:xfrm>
+            <a:off x="4752077" y="2427735"/>
+            <a:ext cx="6805384" cy="369332"/>
+          </a:xfrm>
+          <a:prstGeom prst="rect">
+            <a:avLst/>
+          </a:prstGeom>
+        </p:spPr>
+        <p:txBody>
+          <a:bodyPr wrap="square">
+            <a:spAutoFit/>
+          </a:bodyPr>
+          <a:lstStyle/>
+          <a:p>
+            <a:r>
+              <a:rPr lang="es-ES" dirty="0">
+                <a:hlinkClick r:id="rId4"/>
+              </a:rPr>
+              <a:t>https://github.com/juanluelguerre/Training/tree/master/CSFeatures</a:t>
+            </a:r>
+            <a:r>
+              <a:rPr lang="es-ES" dirty="0" smtClean="0">
+                <a:hlinkClick r:id="rId4"/>
+              </a:rPr>
+              <a:t>/</a:t>
+            </a:r>
+            <a:r>
+              <a:rPr lang="es-ES" dirty="0" smtClean="0"/>
+              <a:t> </a:t>
+            </a:r>
+            <a:endParaRPr lang="es-ES" dirty="0"/>
+          </a:p>
+        </p:txBody>
+      </p:sp>
+      <p:pic>
+        <p:nvPicPr>
+          <p:cNvPr id="4" name="Picture 2" descr="Resultado de imagen de github">
+            <a:hlinkClick r:id="rId4"/>
+          </p:cNvPr>
+          <p:cNvPicPr>
+            <a:picLocks noChangeAspect="1" noChangeArrowheads="1"/>
+          </p:cNvPicPr>
+          <p:nvPr/>
+        </p:nvPicPr>
+        <p:blipFill>
+          <a:blip r:embed="rId5" cstate="print">
+            <a:extLst>
+              <a:ext uri="{28A0092B-C50C-407E-A947-70E740481C1C}">
+                <a14:useLocalDpi xmlns:a14="http://schemas.microsoft.com/office/drawing/2010/main" val="0"/>
+              </a:ext>
+            </a:extLst>
+          </a:blip>
+          <a:srcRect/>
+          <a:stretch>
+            <a:fillRect/>
+          </a:stretch>
+        </p:blipFill>
+        <p:spPr bwMode="auto">
+          <a:xfrm>
+            <a:off x="8976320" y="1700808"/>
+            <a:ext cx="2242330" cy="745575"/>
+          </a:xfrm>
+          <a:prstGeom prst="rect">
+            <a:avLst/>
+          </a:prstGeom>
+          <a:noFill/>
+          <a:extLst>
+            <a:ext uri="{909E8E84-426E-40DD-AFC4-6F175D3DCCD1}">
+              <a14:hiddenFill xmlns:a14="http://schemas.microsoft.com/office/drawing/2010/main">
+                <a:solidFill>
+                  <a:srgbClr val="FFFFFF"/>
+                </a:solidFill>
+              </a14:hiddenFill>
+            </a:ext>
+          </a:extLst>
+        </p:spPr>
+      </p:pic>
     </p:spTree>
     <p:extLst>
       <p:ext uri="{BB962C8B-B14F-4D97-AF65-F5344CB8AC3E}">

</xml_diff>